<commit_message>
i love to make changes!!
</commit_message>
<xml_diff>
--- a/ClearView-Sarcyk-Project-Proposal.pptx
+++ b/ClearView-Sarcyk-Project-Proposal.pptx
@@ -2372,10 +2372,41 @@
   <pc:docChgLst>
     <pc:chgData name="Luiz Break" userId="3ea80d37ed61a017" providerId="LiveId" clId="{FBF164D9-12EF-47A7-BE3F-D60D4AB53842}"/>
     <pc:docChg chg="undo custSel addSld modSld sldOrd">
-      <pc:chgData name="Luiz Break" userId="3ea80d37ed61a017" providerId="LiveId" clId="{FBF164D9-12EF-47A7-BE3F-D60D4AB53842}" dt="2024-10-28T20:54:38.186" v="2859" actId="1076"/>
+      <pc:chgData name="Luiz Break" userId="3ea80d37ed61a017" providerId="LiveId" clId="{FBF164D9-12EF-47A7-BE3F-D60D4AB53842}" dt="2024-11-08T16:11:03.718" v="2865" actId="207"/>
       <pc:docMkLst>
         <pc:docMk/>
       </pc:docMkLst>
+      <pc:sldChg chg="modSp mod">
+        <pc:chgData name="Luiz Break" userId="3ea80d37ed61a017" providerId="LiveId" clId="{FBF164D9-12EF-47A7-BE3F-D60D4AB53842}" dt="2024-11-08T16:11:03.718" v="2865" actId="207"/>
+        <pc:sldMkLst>
+          <pc:docMk/>
+          <pc:sldMk cId="145788081" sldId="256"/>
+        </pc:sldMkLst>
+        <pc:spChg chg="mod">
+          <ac:chgData name="Luiz Break" userId="3ea80d37ed61a017" providerId="LiveId" clId="{FBF164D9-12EF-47A7-BE3F-D60D4AB53842}" dt="2024-11-08T16:10:36.890" v="2862" actId="207"/>
+          <ac:spMkLst>
+            <pc:docMk/>
+            <pc:sldMk cId="145788081" sldId="256"/>
+            <ac:spMk id="4" creationId="{A26BBEAE-146D-D796-E7EC-15C5B454B866}"/>
+          </ac:spMkLst>
+        </pc:spChg>
+        <pc:spChg chg="mod">
+          <ac:chgData name="Luiz Break" userId="3ea80d37ed61a017" providerId="LiveId" clId="{FBF164D9-12EF-47A7-BE3F-D60D4AB53842}" dt="2024-11-08T16:10:43.640" v="2863" actId="207"/>
+          <ac:spMkLst>
+            <pc:docMk/>
+            <pc:sldMk cId="145788081" sldId="256"/>
+            <ac:spMk id="6" creationId="{8A5841FE-85B5-5D78-9833-41A619C7FAA3}"/>
+          </ac:spMkLst>
+        </pc:spChg>
+        <pc:spChg chg="mod">
+          <ac:chgData name="Luiz Break" userId="3ea80d37ed61a017" providerId="LiveId" clId="{FBF164D9-12EF-47A7-BE3F-D60D4AB53842}" dt="2024-11-08T16:11:03.718" v="2865" actId="207"/>
+          <ac:spMkLst>
+            <pc:docMk/>
+            <pc:sldMk cId="145788081" sldId="256"/>
+            <ac:spMk id="9" creationId="{FA976E77-58C6-B999-F3EA-E3EFC61DED6D}"/>
+          </ac:spMkLst>
+        </pc:spChg>
+      </pc:sldChg>
       <pc:sldChg chg="modSp mod">
         <pc:chgData name="Luiz Break" userId="3ea80d37ed61a017" providerId="LiveId" clId="{FBF164D9-12EF-47A7-BE3F-D60D4AB53842}" dt="2024-10-09T14:34:57.505" v="779" actId="113"/>
         <pc:sldMkLst>
@@ -7751,7 +7782,7 @@
           <a:p>
             <a:fld id="{4B97C09A-2347-409D-9A31-A496097CEE40}" type="datetimeFigureOut">
               <a:rPr lang="en-US" smtClean="0"/>
-              <a:t>10/28/2024</a:t>
+              <a:t>11/8/2024</a:t>
             </a:fld>
             <a:endParaRPr lang="en-US"/>
           </a:p>
@@ -8662,7 +8693,7 @@
           <a:p>
             <a:fld id="{30DA992D-B031-451B-91EA-A22FE9180760}" type="datetimeFigureOut">
               <a:rPr lang="en-US" smtClean="0"/>
-              <a:t>10/28/2024</a:t>
+              <a:t>11/8/2024</a:t>
             </a:fld>
             <a:endParaRPr lang="en-US"/>
           </a:p>
@@ -8860,7 +8891,7 @@
           <a:p>
             <a:fld id="{30DA992D-B031-451B-91EA-A22FE9180760}" type="datetimeFigureOut">
               <a:rPr lang="en-US" smtClean="0"/>
-              <a:t>10/28/2024</a:t>
+              <a:t>11/8/2024</a:t>
             </a:fld>
             <a:endParaRPr lang="en-US"/>
           </a:p>
@@ -9068,7 +9099,7 @@
           <a:p>
             <a:fld id="{30DA992D-B031-451B-91EA-A22FE9180760}" type="datetimeFigureOut">
               <a:rPr lang="en-US" smtClean="0"/>
-              <a:t>10/28/2024</a:t>
+              <a:t>11/8/2024</a:t>
             </a:fld>
             <a:endParaRPr lang="en-US"/>
           </a:p>
@@ -9266,7 +9297,7 @@
           <a:p>
             <a:fld id="{30DA992D-B031-451B-91EA-A22FE9180760}" type="datetimeFigureOut">
               <a:rPr lang="en-US" smtClean="0"/>
-              <a:t>10/28/2024</a:t>
+              <a:t>11/8/2024</a:t>
             </a:fld>
             <a:endParaRPr lang="en-US"/>
           </a:p>
@@ -9541,7 +9572,7 @@
           <a:p>
             <a:fld id="{30DA992D-B031-451B-91EA-A22FE9180760}" type="datetimeFigureOut">
               <a:rPr lang="en-US" smtClean="0"/>
-              <a:t>10/28/2024</a:t>
+              <a:t>11/8/2024</a:t>
             </a:fld>
             <a:endParaRPr lang="en-US"/>
           </a:p>
@@ -9806,7 +9837,7 @@
           <a:p>
             <a:fld id="{30DA992D-B031-451B-91EA-A22FE9180760}" type="datetimeFigureOut">
               <a:rPr lang="en-US" smtClean="0"/>
-              <a:t>10/28/2024</a:t>
+              <a:t>11/8/2024</a:t>
             </a:fld>
             <a:endParaRPr lang="en-US"/>
           </a:p>
@@ -10218,7 +10249,7 @@
           <a:p>
             <a:fld id="{30DA992D-B031-451B-91EA-A22FE9180760}" type="datetimeFigureOut">
               <a:rPr lang="en-US" smtClean="0"/>
-              <a:t>10/28/2024</a:t>
+              <a:t>11/8/2024</a:t>
             </a:fld>
             <a:endParaRPr lang="en-US"/>
           </a:p>
@@ -10359,7 +10390,7 @@
           <a:p>
             <a:fld id="{30DA992D-B031-451B-91EA-A22FE9180760}" type="datetimeFigureOut">
               <a:rPr lang="en-US" smtClean="0"/>
-              <a:t>10/28/2024</a:t>
+              <a:t>11/8/2024</a:t>
             </a:fld>
             <a:endParaRPr lang="en-US"/>
           </a:p>
@@ -10472,7 +10503,7 @@
           <a:p>
             <a:fld id="{30DA992D-B031-451B-91EA-A22FE9180760}" type="datetimeFigureOut">
               <a:rPr lang="en-US" smtClean="0"/>
-              <a:t>10/28/2024</a:t>
+              <a:t>11/8/2024</a:t>
             </a:fld>
             <a:endParaRPr lang="en-US"/>
           </a:p>
@@ -10783,7 +10814,7 @@
           <a:p>
             <a:fld id="{30DA992D-B031-451B-91EA-A22FE9180760}" type="datetimeFigureOut">
               <a:rPr lang="en-US" smtClean="0"/>
-              <a:t>10/28/2024</a:t>
+              <a:t>11/8/2024</a:t>
             </a:fld>
             <a:endParaRPr lang="en-US"/>
           </a:p>
@@ -11071,7 +11102,7 @@
           <a:p>
             <a:fld id="{30DA992D-B031-451B-91EA-A22FE9180760}" type="datetimeFigureOut">
               <a:rPr lang="en-US" smtClean="0"/>
-              <a:t>10/28/2024</a:t>
+              <a:t>11/8/2024</a:t>
             </a:fld>
             <a:endParaRPr lang="en-US"/>
           </a:p>
@@ -11312,7 +11343,7 @@
           <a:p>
             <a:fld id="{30DA992D-B031-451B-91EA-A22FE9180760}" type="datetimeFigureOut">
               <a:rPr lang="en-US" smtClean="0"/>
-              <a:t>10/28/2024</a:t>
+              <a:t>11/8/2024</a:t>
             </a:fld>
             <a:endParaRPr lang="en-US"/>
           </a:p>
@@ -26158,6 +26189,9 @@
           <a:prstGeom prst="rect">
             <a:avLst/>
           </a:prstGeom>
+          <a:solidFill>
+            <a:schemeClr val="accent4"/>
+          </a:solidFill>
         </p:spPr>
         <p:style>
           <a:lnRef idx="2">
@@ -26256,6 +26290,12 @@
           <a:prstGeom prst="rect">
             <a:avLst/>
           </a:prstGeom>
+          <a:solidFill>
+            <a:schemeClr val="accent4">
+              <a:lumMod val="40000"/>
+              <a:lumOff val="60000"/>
+            </a:schemeClr>
+          </a:solidFill>
         </p:spPr>
         <p:style>
           <a:lnRef idx="2">
@@ -26404,6 +26444,12 @@
           <a:prstGeom prst="rect">
             <a:avLst/>
           </a:prstGeom>
+          <a:solidFill>
+            <a:schemeClr val="accent4">
+              <a:lumMod val="20000"/>
+              <a:lumOff val="80000"/>
+            </a:schemeClr>
+          </a:solidFill>
         </p:spPr>
         <p:style>
           <a:lnRef idx="2">
@@ -26427,17 +26473,29 @@
           <a:p>
             <a:pPr algn="ctr"/>
             <a:r>
-              <a:rPr lang="en-US" sz="1800" b="0" i="1" u="none" strike="noStrike" baseline="0" dirty="0"/>
+              <a:rPr lang="en-US" sz="1800" b="0" i="1" u="none" strike="noStrike" baseline="0" dirty="0">
+                <a:solidFill>
+                  <a:schemeClr val="tx1"/>
+                </a:solidFill>
+              </a:rPr>
               <a:t>SMAC Distributing</a:t>
             </a:r>
           </a:p>
           <a:p>
             <a:pPr algn="ctr"/>
             <a:r>
-              <a:rPr lang="en-US" i="1" dirty="0"/>
+              <a:rPr lang="en-US" i="1" dirty="0">
+                <a:solidFill>
+                  <a:schemeClr val="tx1"/>
+                </a:solidFill>
+              </a:rPr>
               <a:t>(Bingo)</a:t>
             </a:r>
-            <a:endParaRPr lang="en-US" dirty="0"/>
+            <a:endParaRPr lang="en-US" dirty="0">
+              <a:solidFill>
+                <a:schemeClr val="tx1"/>
+              </a:solidFill>
+            </a:endParaRPr>
           </a:p>
         </p:txBody>
       </p:sp>

</xml_diff>